<commit_message>
added some useful links
</commit_message>
<xml_diff>
--- a/Slides_2024_03_05.pptx
+++ b/Slides_2024_03_05.pptx
@@ -5,11 +5,12 @@
     <p:sldMasterId id="2147483648" r:id="rId1"/>
   </p:sldMasterIdLst>
   <p:notesMasterIdLst>
-    <p:notesMasterId r:id="rId4"/>
+    <p:notesMasterId r:id="rId5"/>
   </p:notesMasterIdLst>
   <p:sldIdLst>
     <p:sldId id="256" r:id="rId2"/>
     <p:sldId id="257" r:id="rId3"/>
+    <p:sldId id="258" r:id="rId4"/>
   </p:sldIdLst>
   <p:sldSz cx="12192000" cy="6858000"/>
   <p:notesSz cx="6858000" cy="9144000"/>
@@ -108,6 +109,11 @@
       </a:defRPr>
     </a:lvl9pPr>
   </p:defaultTextStyle>
+  <p:extLst>
+    <p:ext uri="{EFAFB233-063F-42B5-8137-9DF3F51BA10A}">
+      <p15:sldGuideLst xmlns:p15="http://schemas.microsoft.com/office/powerpoint/2012/main"/>
+    </p:ext>
+  </p:extLst>
 </p:presentation>
 </file>
 
@@ -4349,6 +4355,172 @@
     <p:extLst>
       <p:ext uri="{BB962C8B-B14F-4D97-AF65-F5344CB8AC3E}">
         <p14:creationId xmlns:p14="http://schemas.microsoft.com/office/powerpoint/2010/main" val="4163755828"/>
+      </p:ext>
+    </p:extLst>
+  </p:cSld>
+  <p:clrMapOvr>
+    <a:masterClrMapping/>
+  </p:clrMapOvr>
+</p:sld>
+</file>
+
+<file path=ppt/slides/slide3.xml><?xml version="1.0" encoding="utf-8"?>
+<p:sld xmlns:a="http://schemas.openxmlformats.org/drawingml/2006/main" xmlns:r="http://schemas.openxmlformats.org/officeDocument/2006/relationships" xmlns:p="http://schemas.openxmlformats.org/presentationml/2006/main">
+  <p:cSld>
+    <p:spTree>
+      <p:nvGrpSpPr>
+        <p:cNvPr id="1" name=""/>
+        <p:cNvGrpSpPr/>
+        <p:nvPr/>
+      </p:nvGrpSpPr>
+      <p:grpSpPr>
+        <a:xfrm>
+          <a:off x="0" y="0"/>
+          <a:ext cx="0" cy="0"/>
+          <a:chOff x="0" y="0"/>
+          <a:chExt cx="0" cy="0"/>
+        </a:xfrm>
+      </p:grpSpPr>
+      <p:sp>
+        <p:nvSpPr>
+          <p:cNvPr id="2" name="Titolo 1">
+            <a:extLst>
+              <a:ext uri="{FF2B5EF4-FFF2-40B4-BE49-F238E27FC236}">
+                <a16:creationId xmlns:a16="http://schemas.microsoft.com/office/drawing/2014/main" id="{B07444E6-F987-AE3C-6146-288CD9FD9BE5}"/>
+              </a:ext>
+            </a:extLst>
+          </p:cNvPr>
+          <p:cNvSpPr>
+            <a:spLocks noGrp="1"/>
+          </p:cNvSpPr>
+          <p:nvPr>
+            <p:ph type="title"/>
+          </p:nvPr>
+        </p:nvSpPr>
+        <p:spPr/>
+        <p:txBody>
+          <a:bodyPr/>
+          <a:lstStyle/>
+          <a:p>
+            <a:r>
+              <a:rPr lang="en-GB" sz="4400" b="1" dirty="0">
+                <a:latin typeface="Livvic" pitchFamily="2" charset="0"/>
+              </a:rPr>
+              <a:t>Some useful links</a:t>
+            </a:r>
+            <a:endParaRPr lang="en-GB" dirty="0"/>
+          </a:p>
+        </p:txBody>
+      </p:sp>
+      <p:sp>
+        <p:nvSpPr>
+          <p:cNvPr id="3" name="Segnaposto contenuto 2">
+            <a:extLst>
+              <a:ext uri="{FF2B5EF4-FFF2-40B4-BE49-F238E27FC236}">
+                <a16:creationId xmlns:a16="http://schemas.microsoft.com/office/drawing/2014/main" id="{15B8017E-49ED-3366-9FF3-3CEFBCE198A3}"/>
+              </a:ext>
+            </a:extLst>
+          </p:cNvPr>
+          <p:cNvSpPr>
+            <a:spLocks noGrp="1"/>
+          </p:cNvSpPr>
+          <p:nvPr>
+            <p:ph idx="1"/>
+          </p:nvPr>
+        </p:nvSpPr>
+        <p:spPr/>
+        <p:txBody>
+          <a:bodyPr/>
+          <a:lstStyle/>
+          <a:p>
+            <a:pPr marL="0" indent="0">
+              <a:buNone/>
+            </a:pPr>
+            <a:r>
+              <a:rPr lang="en-GB" dirty="0">
+                <a:hlinkClick r:id="rId2"/>
+              </a:rPr>
+              <a:t>https://it.mathworks.com/help/simulink/slref/relay.html</a:t>
+            </a:r>
+            <a:endParaRPr lang="en-GB" dirty="0"/>
+          </a:p>
+          <a:p>
+            <a:pPr marL="0" indent="0">
+              <a:buNone/>
+            </a:pPr>
+            <a:r>
+              <a:rPr lang="en-GB" dirty="0">
+                <a:hlinkClick r:id="rId3"/>
+              </a:rPr>
+              <a:t>https://it.mathworks.com/help/simulink/slref/pidcontroller.html</a:t>
+            </a:r>
+            <a:endParaRPr lang="en-GB" dirty="0"/>
+          </a:p>
+          <a:p>
+            <a:pPr marL="0" indent="0">
+              <a:buNone/>
+            </a:pPr>
+            <a:r>
+              <a:rPr lang="en-GB" dirty="0">
+                <a:hlinkClick r:id="rId4"/>
+              </a:rPr>
+              <a:t>https://it.mathworks.com/help/slcontrol/ug/analyze-the-design-in-the-pid-tuner.html</a:t>
+            </a:r>
+            <a:endParaRPr lang="en-GB" dirty="0"/>
+          </a:p>
+          <a:p>
+            <a:pPr marL="0" indent="0">
+              <a:buNone/>
+            </a:pPr>
+            <a:r>
+              <a:rPr lang="en-GB" dirty="0"/>
+              <a:t> </a:t>
+            </a:r>
+          </a:p>
+          <a:p>
+            <a:pPr marL="0" indent="0">
+              <a:buNone/>
+            </a:pPr>
+            <a:r>
+              <a:rPr lang="en-GB" dirty="0"/>
+              <a:t>The code will be available both on Aulaweb and GitHub at the end of the lecture.</a:t>
+            </a:r>
+          </a:p>
+        </p:txBody>
+      </p:sp>
+      <p:sp>
+        <p:nvSpPr>
+          <p:cNvPr id="4" name="Segnaposto numero diapositiva 3">
+            <a:extLst>
+              <a:ext uri="{FF2B5EF4-FFF2-40B4-BE49-F238E27FC236}">
+                <a16:creationId xmlns:a16="http://schemas.microsoft.com/office/drawing/2014/main" id="{1E619D9F-3ABC-A9E7-17C8-44BC9E9D861C}"/>
+              </a:ext>
+            </a:extLst>
+          </p:cNvPr>
+          <p:cNvSpPr>
+            <a:spLocks noGrp="1"/>
+          </p:cNvSpPr>
+          <p:nvPr>
+            <p:ph type="sldNum" sz="quarter" idx="12"/>
+          </p:nvPr>
+        </p:nvSpPr>
+        <p:spPr/>
+        <p:txBody>
+          <a:bodyPr/>
+          <a:lstStyle/>
+          <a:p>
+            <a:fld id="{9F5E69EA-D9AA-4EF3-95AF-F31BB21A9640}" type="slidenum">
+              <a:rPr lang="en-GB" smtClean="0"/>
+              <a:t>3</a:t>
+            </a:fld>
+            <a:endParaRPr lang="en-GB"/>
+          </a:p>
+        </p:txBody>
+      </p:sp>
+    </p:spTree>
+    <p:extLst>
+      <p:ext uri="{BB962C8B-B14F-4D97-AF65-F5344CB8AC3E}">
+        <p14:creationId xmlns:p14="http://schemas.microsoft.com/office/powerpoint/2010/main" val="1604707847"/>
       </p:ext>
     </p:extLst>
   </p:cSld>

</xml_diff>

<commit_message>
added the explanation of the relay with three outputs and link for the interpolate check
</commit_message>
<xml_diff>
--- a/Slides_2024_03_05.pptx
+++ b/Slides_2024_03_05.pptx
@@ -199,7 +199,7 @@
           <a:p>
             <a:fld id="{C7A7CF56-B302-4427-8C40-A99503A3A32E}" type="datetimeFigureOut">
               <a:rPr lang="en-GB" smtClean="0"/>
-              <a:t>03/03/2024</a:t>
+              <a:t>04/03/2024</a:t>
             </a:fld>
             <a:endParaRPr lang="en-GB"/>
           </a:p>
@@ -616,7 +616,7 @@
           <a:p>
             <a:fld id="{D57F8068-A4BD-46A9-A9F6-15E39850A33D}" type="datetime1">
               <a:rPr lang="en-GB" smtClean="0"/>
-              <a:t>03/03/2024</a:t>
+              <a:t>04/03/2024</a:t>
             </a:fld>
             <a:endParaRPr lang="en-GB"/>
           </a:p>
@@ -816,7 +816,7 @@
           <a:p>
             <a:fld id="{326EB8B2-D9AF-4699-A72C-7ED3FA233D29}" type="datetime1">
               <a:rPr lang="en-GB" smtClean="0"/>
-              <a:t>03/03/2024</a:t>
+              <a:t>04/03/2024</a:t>
             </a:fld>
             <a:endParaRPr lang="en-GB"/>
           </a:p>
@@ -1026,7 +1026,7 @@
           <a:p>
             <a:fld id="{E1037080-5F9A-4A47-9540-6FD3D2565842}" type="datetime1">
               <a:rPr lang="en-GB" smtClean="0"/>
-              <a:t>03/03/2024</a:t>
+              <a:t>04/03/2024</a:t>
             </a:fld>
             <a:endParaRPr lang="en-GB"/>
           </a:p>
@@ -1226,7 +1226,7 @@
           <a:p>
             <a:fld id="{BA40BF8E-F275-4E3B-9AF8-F20E895D9D8E}" type="datetime1">
               <a:rPr lang="en-GB" smtClean="0"/>
-              <a:t>03/03/2024</a:t>
+              <a:t>04/03/2024</a:t>
             </a:fld>
             <a:endParaRPr lang="en-GB"/>
           </a:p>
@@ -1502,7 +1502,7 @@
           <a:p>
             <a:fld id="{229E73D9-F1F0-481C-A9DB-3EDB427312E2}" type="datetime1">
               <a:rPr lang="en-GB" smtClean="0"/>
-              <a:t>03/03/2024</a:t>
+              <a:t>04/03/2024</a:t>
             </a:fld>
             <a:endParaRPr lang="en-GB"/>
           </a:p>
@@ -1770,7 +1770,7 @@
           <a:p>
             <a:fld id="{0019E87F-A25D-4BB4-B6BF-C334BA340B03}" type="datetime1">
               <a:rPr lang="en-GB" smtClean="0"/>
-              <a:t>03/03/2024</a:t>
+              <a:t>04/03/2024</a:t>
             </a:fld>
             <a:endParaRPr lang="en-GB"/>
           </a:p>
@@ -2185,7 +2185,7 @@
           <a:p>
             <a:fld id="{B013EEA9-E231-4204-A223-01A4A80E5990}" type="datetime1">
               <a:rPr lang="en-GB" smtClean="0"/>
-              <a:t>03/03/2024</a:t>
+              <a:t>04/03/2024</a:t>
             </a:fld>
             <a:endParaRPr lang="en-GB"/>
           </a:p>
@@ -2327,7 +2327,7 @@
           <a:p>
             <a:fld id="{1369ADAA-09CB-467E-8BDB-D8AFDA343369}" type="datetime1">
               <a:rPr lang="en-GB" smtClean="0"/>
-              <a:t>03/03/2024</a:t>
+              <a:t>04/03/2024</a:t>
             </a:fld>
             <a:endParaRPr lang="en-GB"/>
           </a:p>
@@ -2440,7 +2440,7 @@
           <a:p>
             <a:fld id="{9B625AE8-76FF-4D07-849C-2475A39E401D}" type="datetime1">
               <a:rPr lang="en-GB" smtClean="0"/>
-              <a:t>03/03/2024</a:t>
+              <a:t>04/03/2024</a:t>
             </a:fld>
             <a:endParaRPr lang="en-GB"/>
           </a:p>
@@ -2753,7 +2753,7 @@
           <a:p>
             <a:fld id="{8016F5D4-646A-4A30-BC45-22D666AE0CCD}" type="datetime1">
               <a:rPr lang="en-GB" smtClean="0"/>
-              <a:t>03/03/2024</a:t>
+              <a:t>04/03/2024</a:t>
             </a:fld>
             <a:endParaRPr lang="en-GB"/>
           </a:p>
@@ -3042,7 +3042,7 @@
           <a:p>
             <a:fld id="{5FDDE6C6-474F-4C2A-8FC6-7123BBA8410F}" type="datetime1">
               <a:rPr lang="en-GB" smtClean="0"/>
-              <a:t>03/03/2024</a:t>
+              <a:t>04/03/2024</a:t>
             </a:fld>
             <a:endParaRPr lang="en-GB"/>
           </a:p>
@@ -3285,7 +3285,7 @@
           <a:p>
             <a:fld id="{F16AE817-1B10-47A6-A3BE-4223F62F74BF}" type="datetime1">
               <a:rPr lang="en-GB" smtClean="0"/>
-              <a:t>03/03/2024</a:t>
+              <a:t>04/03/2024</a:t>
             </a:fld>
             <a:endParaRPr lang="en-GB"/>
           </a:p>
@@ -4432,6 +4432,17 @@
         <p:txBody>
           <a:bodyPr/>
           <a:lstStyle/>
+          <a:p>
+            <a:pPr marL="0" indent="0">
+              <a:buNone/>
+            </a:pPr>
+            <a:r>
+              <a:rPr lang="en-GB">
+                <a:hlinkClick r:id="rId2"/>
+              </a:rPr>
+              <a:t>https://it.mathworks.com/help/simulink/slref/fromworkspace.html</a:t>
+            </a:r>
+          </a:p>
           <a:p>
             <a:pPr marL="0" indent="0">
               <a:buNone/>

</xml_diff>